<commit_message>
Minor updates to ppts 9 & 10
</commit_message>
<xml_diff>
--- a/presentations/10 - The Wrapup.pptx
+++ b/presentations/10 - The Wrapup.pptx
@@ -5,7 +5,7 @@
     <p:sldMasterId id="2147483648" r:id="rId1"/>
   </p:sldMasterIdLst>
   <p:notesMasterIdLst>
-    <p:notesMasterId r:id="rId13"/>
+    <p:notesMasterId r:id="rId12"/>
   </p:notesMasterIdLst>
   <p:sldIdLst>
     <p:sldId id="256" r:id="rId2"/>
@@ -18,7 +18,6 @@
     <p:sldId id="281" r:id="rId9"/>
     <p:sldId id="314" r:id="rId10"/>
     <p:sldId id="294" r:id="rId11"/>
-    <p:sldId id="282" r:id="rId12"/>
   </p:sldIdLst>
   <p:sldSz cx="12192000" cy="6858000"/>
   <p:notesSz cx="6858000" cy="9144000"/>
@@ -207,7 +206,7 @@
           <a:p>
             <a:fld id="{4939F8F8-93F0-4725-B8AC-62F8A64AB462}" type="datetimeFigureOut">
               <a:rPr lang="en-US" smtClean="0"/>
-              <a:t>12/8/2023</a:t>
+              <a:t>4/11/2025</a:t>
             </a:fld>
             <a:endParaRPr lang="en-US"/>
           </a:p>
@@ -937,7 +936,7 @@
           <a:p>
             <a:fld id="{5AE7D92D-7924-41BC-B683-3648DB58E650}" type="datetimeFigureOut">
               <a:rPr lang="en-US" smtClean="0"/>
-              <a:t>12/8/2023</a:t>
+              <a:t>4/11/2025</a:t>
             </a:fld>
             <a:endParaRPr lang="en-US"/>
           </a:p>
@@ -12890,7 +12889,7 @@
           <a:p>
             <a:fld id="{5AE7D92D-7924-41BC-B683-3648DB58E650}" type="datetimeFigureOut">
               <a:rPr lang="en-US" smtClean="0"/>
-              <a:t>12/8/2023</a:t>
+              <a:t>4/11/2025</a:t>
             </a:fld>
             <a:endParaRPr lang="en-US"/>
           </a:p>
@@ -13098,7 +13097,7 @@
           <a:p>
             <a:fld id="{5AE7D92D-7924-41BC-B683-3648DB58E650}" type="datetimeFigureOut">
               <a:rPr lang="en-US" smtClean="0"/>
-              <a:t>12/8/2023</a:t>
+              <a:t>4/11/2025</a:t>
             </a:fld>
             <a:endParaRPr lang="en-US"/>
           </a:p>
@@ -25494,7 +25493,7 @@
           <a:p>
             <a:fld id="{5AE7D92D-7924-41BC-B683-3648DB58E650}" type="datetimeFigureOut">
               <a:rPr lang="en-US" smtClean="0"/>
-              <a:t>12/8/2023</a:t>
+              <a:t>4/11/2025</a:t>
             </a:fld>
             <a:endParaRPr lang="en-US"/>
           </a:p>
@@ -25896,7 +25895,7 @@
           <a:p>
             <a:fld id="{5AE7D92D-7924-41BC-B683-3648DB58E650}" type="datetimeFigureOut">
               <a:rPr lang="en-US" smtClean="0"/>
-              <a:t>12/8/2023</a:t>
+              <a:t>4/11/2025</a:t>
             </a:fld>
             <a:endParaRPr lang="en-US"/>
           </a:p>
@@ -26161,7 +26160,7 @@
           <a:p>
             <a:fld id="{5AE7D92D-7924-41BC-B683-3648DB58E650}" type="datetimeFigureOut">
               <a:rPr lang="en-US" smtClean="0"/>
-              <a:t>12/8/2023</a:t>
+              <a:t>4/11/2025</a:t>
             </a:fld>
             <a:endParaRPr lang="en-US"/>
           </a:p>
@@ -26573,7 +26572,7 @@
           <a:p>
             <a:fld id="{5AE7D92D-7924-41BC-B683-3648DB58E650}" type="datetimeFigureOut">
               <a:rPr lang="en-US" smtClean="0"/>
-              <a:t>12/8/2023</a:t>
+              <a:t>4/11/2025</a:t>
             </a:fld>
             <a:endParaRPr lang="en-US"/>
           </a:p>
@@ -26714,7 +26713,7 @@
           <a:p>
             <a:fld id="{5AE7D92D-7924-41BC-B683-3648DB58E650}" type="datetimeFigureOut">
               <a:rPr lang="en-US" smtClean="0"/>
-              <a:t>12/8/2023</a:t>
+              <a:t>4/11/2025</a:t>
             </a:fld>
             <a:endParaRPr lang="en-US"/>
           </a:p>
@@ -26827,7 +26826,7 @@
           <a:p>
             <a:fld id="{5AE7D92D-7924-41BC-B683-3648DB58E650}" type="datetimeFigureOut">
               <a:rPr lang="en-US" smtClean="0"/>
-              <a:t>12/8/2023</a:t>
+              <a:t>4/11/2025</a:t>
             </a:fld>
             <a:endParaRPr lang="en-US"/>
           </a:p>
@@ -27138,7 +27137,7 @@
           <a:p>
             <a:fld id="{5AE7D92D-7924-41BC-B683-3648DB58E650}" type="datetimeFigureOut">
               <a:rPr lang="en-US" smtClean="0"/>
-              <a:t>12/8/2023</a:t>
+              <a:t>4/11/2025</a:t>
             </a:fld>
             <a:endParaRPr lang="en-US"/>
           </a:p>
@@ -27426,7 +27425,7 @@
           <a:p>
             <a:fld id="{5AE7D92D-7924-41BC-B683-3648DB58E650}" type="datetimeFigureOut">
               <a:rPr lang="en-US" smtClean="0"/>
-              <a:t>12/8/2023</a:t>
+              <a:t>4/11/2025</a:t>
             </a:fld>
             <a:endParaRPr lang="en-US"/>
           </a:p>
@@ -27667,7 +27666,7 @@
           <a:p>
             <a:fld id="{5AE7D92D-7924-41BC-B683-3648DB58E650}" type="datetimeFigureOut">
               <a:rPr lang="en-US" smtClean="0"/>
-              <a:t>12/8/2023</a:t>
+              <a:t>4/11/2025</a:t>
             </a:fld>
             <a:endParaRPr lang="en-US"/>
           </a:p>
@@ -28593,777 +28592,6 @@
 </p:sld>
 </file>
 
-<file path=ppt/slides/slide11.xml><?xml version="1.0" encoding="utf-8"?>
-<p:sld xmlns:a="http://schemas.openxmlformats.org/drawingml/2006/main" xmlns:r="http://schemas.openxmlformats.org/officeDocument/2006/relationships" xmlns:p="http://schemas.openxmlformats.org/presentationml/2006/main">
-  <p:cSld>
-    <p:spTree>
-      <p:nvGrpSpPr>
-        <p:cNvPr id="1" name=""/>
-        <p:cNvGrpSpPr/>
-        <p:nvPr/>
-      </p:nvGrpSpPr>
-      <p:grpSpPr>
-        <a:xfrm>
-          <a:off x="0" y="0"/>
-          <a:ext cx="0" cy="0"/>
-          <a:chOff x="0" y="0"/>
-          <a:chExt cx="0" cy="0"/>
-        </a:xfrm>
-      </p:grpSpPr>
-      <p:sp>
-        <p:nvSpPr>
-          <p:cNvPr id="2" name="Title 1">
-            <a:extLst>
-              <a:ext uri="{FF2B5EF4-FFF2-40B4-BE49-F238E27FC236}">
-                <a16:creationId xmlns:a16="http://schemas.microsoft.com/office/drawing/2014/main" id="{5948632D-85F8-42B0-A253-0058D2F1434C}"/>
-              </a:ext>
-            </a:extLst>
-          </p:cNvPr>
-          <p:cNvSpPr>
-            <a:spLocks noGrp="1"/>
-          </p:cNvSpPr>
-          <p:nvPr>
-            <p:ph type="title"/>
-          </p:nvPr>
-        </p:nvSpPr>
-        <p:spPr/>
-        <p:txBody>
-          <a:bodyPr/>
-          <a:lstStyle/>
-          <a:p>
-            <a:r>
-              <a:rPr lang="en-US" dirty="0"/>
-              <a:t>Special Thanks</a:t>
-            </a:r>
-          </a:p>
-        </p:txBody>
-      </p:sp>
-      <p:sp>
-        <p:nvSpPr>
-          <p:cNvPr id="3" name="Content Placeholder 2">
-            <a:extLst>
-              <a:ext uri="{FF2B5EF4-FFF2-40B4-BE49-F238E27FC236}">
-                <a16:creationId xmlns:a16="http://schemas.microsoft.com/office/drawing/2014/main" id="{83E3E4B2-7133-4FC6-A327-1909DE418BDA}"/>
-              </a:ext>
-            </a:extLst>
-          </p:cNvPr>
-          <p:cNvSpPr>
-            <a:spLocks noGrp="1"/>
-          </p:cNvSpPr>
-          <p:nvPr>
-            <p:ph idx="1"/>
-          </p:nvPr>
-        </p:nvSpPr>
-        <p:spPr>
-          <a:xfrm>
-            <a:off x="1" y="2379216"/>
-            <a:ext cx="5939159" cy="4478784"/>
-          </a:xfrm>
-        </p:spPr>
-        <p:txBody>
-          <a:bodyPr>
-            <a:normAutofit fontScale="92500" lnSpcReduction="10000"/>
-          </a:bodyPr>
-          <a:lstStyle/>
-          <a:p>
-            <a:pPr marL="514350" indent="0">
-              <a:buNone/>
-            </a:pPr>
-            <a:r>
-              <a:rPr lang="en-US" b="1" dirty="0"/>
-              <a:t>Justin:</a:t>
-            </a:r>
-          </a:p>
-          <a:p>
-            <a:pPr marL="514350" indent="0">
-              <a:buNone/>
-            </a:pPr>
-            <a:r>
-              <a:rPr lang="en-US" i="1" dirty="0"/>
-              <a:t>Franz Mueter </a:t>
-            </a:r>
-            <a:r>
-              <a:rPr lang="en-US" dirty="0"/>
-              <a:t>(UAF)</a:t>
-            </a:r>
-          </a:p>
-          <a:p>
-            <a:pPr marL="514350" indent="0">
-              <a:buNone/>
-            </a:pPr>
-            <a:r>
-              <a:rPr lang="en-US" i="1" dirty="0"/>
-              <a:t>Ben Williams </a:t>
-            </a:r>
-            <a:r>
-              <a:rPr lang="en-US" dirty="0"/>
-              <a:t>(NOAA/ADF&amp;G)</a:t>
-            </a:r>
-          </a:p>
-          <a:p>
-            <a:pPr marL="514350" indent="0">
-              <a:buNone/>
-            </a:pPr>
-            <a:r>
-              <a:rPr lang="en-US" i="1" dirty="0"/>
-              <a:t>Jordan Watson </a:t>
-            </a:r>
-            <a:r>
-              <a:rPr lang="en-US" dirty="0"/>
-              <a:t>(NOAA)</a:t>
-            </a:r>
-          </a:p>
-          <a:p>
-            <a:pPr marL="514350" indent="0">
-              <a:buNone/>
-            </a:pPr>
-            <a:r>
-              <a:rPr lang="en-US" i="1" dirty="0"/>
-              <a:t>Curry Cunningham </a:t>
-            </a:r>
-            <a:r>
-              <a:rPr lang="en-US" dirty="0"/>
-              <a:t>(UAF)</a:t>
-            </a:r>
-          </a:p>
-          <a:p>
-            <a:pPr marL="514350" indent="0">
-              <a:buNone/>
-            </a:pPr>
-            <a:r>
-              <a:rPr lang="en-US" i="1" dirty="0"/>
-              <a:t>Jenny Bryan </a:t>
-            </a:r>
-            <a:r>
-              <a:rPr lang="en-US" dirty="0"/>
-              <a:t>(UBC)</a:t>
-            </a:r>
-          </a:p>
-          <a:p>
-            <a:pPr marL="514350" indent="0">
-              <a:buNone/>
-            </a:pPr>
-            <a:r>
-              <a:rPr lang="en-US" i="1" dirty="0"/>
-              <a:t>Hadley Wickham </a:t>
-            </a:r>
-            <a:r>
-              <a:rPr lang="en-US" dirty="0"/>
-              <a:t>(RStudio)</a:t>
-            </a:r>
-          </a:p>
-          <a:p>
-            <a:pPr marL="514350" indent="0">
-              <a:buNone/>
-            </a:pPr>
-            <a:r>
-              <a:rPr lang="en-US" i="1" dirty="0"/>
-              <a:t>Allison Horst </a:t>
-            </a:r>
-            <a:r>
-              <a:rPr lang="en-US" dirty="0"/>
-              <a:t>(RStudio)</a:t>
-            </a:r>
-          </a:p>
-          <a:p>
-            <a:pPr marL="514350" indent="0">
-              <a:buNone/>
-            </a:pPr>
-            <a:r>
-              <a:rPr lang="en-US" i="1" dirty="0"/>
-              <a:t>Rhea Ehresmann</a:t>
-            </a:r>
-            <a:r>
-              <a:rPr lang="en-US" dirty="0"/>
-              <a:t> (ADF&amp;G)</a:t>
-            </a:r>
-          </a:p>
-          <a:p>
-            <a:pPr marL="514350" indent="0">
-              <a:buNone/>
-            </a:pPr>
-            <a:r>
-              <a:rPr lang="en-US" i="1" dirty="0"/>
-              <a:t>Adam Reimer </a:t>
-            </a:r>
-            <a:r>
-              <a:rPr lang="en-US" dirty="0"/>
-              <a:t>(ADF&amp;G)</a:t>
-            </a:r>
-          </a:p>
-        </p:txBody>
-      </p:sp>
-      <p:sp>
-        <p:nvSpPr>
-          <p:cNvPr id="4" name="Slide Number Placeholder 3">
-            <a:extLst>
-              <a:ext uri="{FF2B5EF4-FFF2-40B4-BE49-F238E27FC236}">
-                <a16:creationId xmlns:a16="http://schemas.microsoft.com/office/drawing/2014/main" id="{E06F703E-3B49-4893-9772-A8F666081C12}"/>
-              </a:ext>
-            </a:extLst>
-          </p:cNvPr>
-          <p:cNvSpPr>
-            <a:spLocks noGrp="1"/>
-          </p:cNvSpPr>
-          <p:nvPr>
-            <p:ph type="sldNum" sz="quarter" idx="12"/>
-          </p:nvPr>
-        </p:nvSpPr>
-        <p:spPr/>
-        <p:txBody>
-          <a:bodyPr/>
-          <a:lstStyle/>
-          <a:p>
-            <a:fld id="{6D95AE55-B5F4-483D-AEFF-E8059F5502F5}" type="slidenum">
-              <a:rPr lang="en-US" smtClean="0"/>
-              <a:t>11</a:t>
-            </a:fld>
-            <a:endParaRPr lang="en-US"/>
-          </a:p>
-        </p:txBody>
-      </p:sp>
-      <p:sp>
-        <p:nvSpPr>
-          <p:cNvPr id="5" name="Content Placeholder 2">
-            <a:extLst>
-              <a:ext uri="{FF2B5EF4-FFF2-40B4-BE49-F238E27FC236}">
-                <a16:creationId xmlns:a16="http://schemas.microsoft.com/office/drawing/2014/main" id="{39692689-ACDC-085B-EB29-1F202833FE78}"/>
-              </a:ext>
-            </a:extLst>
-          </p:cNvPr>
-          <p:cNvSpPr txBox="1">
-            <a:spLocks/>
-          </p:cNvSpPr>
-          <p:nvPr/>
-        </p:nvSpPr>
-        <p:spPr>
-          <a:xfrm>
-            <a:off x="5319205" y="2379213"/>
-            <a:ext cx="6872796" cy="4478785"/>
-          </a:xfrm>
-          <a:prstGeom prst="rect">
-            <a:avLst/>
-          </a:prstGeom>
-        </p:spPr>
-        <p:txBody>
-          <a:bodyPr vert="horz" lIns="91440" tIns="45720" rIns="91440" bIns="45720" rtlCol="0">
-            <a:normAutofit/>
-          </a:bodyPr>
-          <a:lstStyle>
-            <a:lvl1pPr marL="228600" indent="-228600" algn="l" defTabSz="914400" rtl="0" eaLnBrk="1" latinLnBrk="0" hangingPunct="1">
-              <a:lnSpc>
-                <a:spcPct val="90000"/>
-              </a:lnSpc>
-              <a:spcBef>
-                <a:spcPts val="1000"/>
-              </a:spcBef>
-              <a:buFont typeface="Arial" panose="020B0604020202020204" pitchFamily="34" charset="0"/>
-              <a:buChar char="•"/>
-              <a:defRPr sz="2800" kern="1200">
-                <a:solidFill>
-                  <a:schemeClr val="tx1"/>
-                </a:solidFill>
-                <a:latin typeface="+mn-lt"/>
-                <a:ea typeface="+mn-ea"/>
-                <a:cs typeface="+mn-cs"/>
-              </a:defRPr>
-            </a:lvl1pPr>
-            <a:lvl2pPr marL="685800" indent="-228600" algn="l" defTabSz="914400" rtl="0" eaLnBrk="1" latinLnBrk="0" hangingPunct="1">
-              <a:lnSpc>
-                <a:spcPct val="90000"/>
-              </a:lnSpc>
-              <a:spcBef>
-                <a:spcPts val="500"/>
-              </a:spcBef>
-              <a:buFont typeface="Arial" panose="020B0604020202020204" pitchFamily="34" charset="0"/>
-              <a:buChar char="•"/>
-              <a:defRPr sz="2400" kern="1200">
-                <a:solidFill>
-                  <a:schemeClr val="tx1"/>
-                </a:solidFill>
-                <a:latin typeface="+mn-lt"/>
-                <a:ea typeface="+mn-ea"/>
-                <a:cs typeface="+mn-cs"/>
-              </a:defRPr>
-            </a:lvl2pPr>
-            <a:lvl3pPr marL="1143000" indent="-228600" algn="l" defTabSz="914400" rtl="0" eaLnBrk="1" latinLnBrk="0" hangingPunct="1">
-              <a:lnSpc>
-                <a:spcPct val="90000"/>
-              </a:lnSpc>
-              <a:spcBef>
-                <a:spcPts val="500"/>
-              </a:spcBef>
-              <a:buFont typeface="Arial" panose="020B0604020202020204" pitchFamily="34" charset="0"/>
-              <a:buChar char="•"/>
-              <a:defRPr sz="2000" kern="1200">
-                <a:solidFill>
-                  <a:schemeClr val="tx1"/>
-                </a:solidFill>
-                <a:latin typeface="+mn-lt"/>
-                <a:ea typeface="+mn-ea"/>
-                <a:cs typeface="+mn-cs"/>
-              </a:defRPr>
-            </a:lvl3pPr>
-            <a:lvl4pPr marL="1600200" indent="-228600" algn="l" defTabSz="914400" rtl="0" eaLnBrk="1" latinLnBrk="0" hangingPunct="1">
-              <a:lnSpc>
-                <a:spcPct val="90000"/>
-              </a:lnSpc>
-              <a:spcBef>
-                <a:spcPts val="500"/>
-              </a:spcBef>
-              <a:buFont typeface="Arial" panose="020B0604020202020204" pitchFamily="34" charset="0"/>
-              <a:buChar char="•"/>
-              <a:defRPr sz="1800" kern="1200">
-                <a:solidFill>
-                  <a:schemeClr val="tx1"/>
-                </a:solidFill>
-                <a:latin typeface="+mn-lt"/>
-                <a:ea typeface="+mn-ea"/>
-                <a:cs typeface="+mn-cs"/>
-              </a:defRPr>
-            </a:lvl4pPr>
-            <a:lvl5pPr marL="2057400" indent="-228600" algn="l" defTabSz="914400" rtl="0" eaLnBrk="1" latinLnBrk="0" hangingPunct="1">
-              <a:lnSpc>
-                <a:spcPct val="90000"/>
-              </a:lnSpc>
-              <a:spcBef>
-                <a:spcPts val="500"/>
-              </a:spcBef>
-              <a:buFont typeface="Arial" panose="020B0604020202020204" pitchFamily="34" charset="0"/>
-              <a:buChar char="•"/>
-              <a:defRPr sz="1800" kern="1200">
-                <a:solidFill>
-                  <a:schemeClr val="tx1"/>
-                </a:solidFill>
-                <a:latin typeface="+mn-lt"/>
-                <a:ea typeface="+mn-ea"/>
-                <a:cs typeface="+mn-cs"/>
-              </a:defRPr>
-            </a:lvl5pPr>
-            <a:lvl6pPr marL="2514600" indent="-228600" algn="l" defTabSz="914400" rtl="0" eaLnBrk="1" latinLnBrk="0" hangingPunct="1">
-              <a:lnSpc>
-                <a:spcPct val="90000"/>
-              </a:lnSpc>
-              <a:spcBef>
-                <a:spcPts val="500"/>
-              </a:spcBef>
-              <a:buFont typeface="Arial" panose="020B0604020202020204" pitchFamily="34" charset="0"/>
-              <a:buChar char="•"/>
-              <a:defRPr sz="1800" kern="1200">
-                <a:solidFill>
-                  <a:schemeClr val="tx1"/>
-                </a:solidFill>
-                <a:latin typeface="+mn-lt"/>
-                <a:ea typeface="+mn-ea"/>
-                <a:cs typeface="+mn-cs"/>
-              </a:defRPr>
-            </a:lvl6pPr>
-            <a:lvl7pPr marL="2971800" indent="-228600" algn="l" defTabSz="914400" rtl="0" eaLnBrk="1" latinLnBrk="0" hangingPunct="1">
-              <a:lnSpc>
-                <a:spcPct val="90000"/>
-              </a:lnSpc>
-              <a:spcBef>
-                <a:spcPts val="500"/>
-              </a:spcBef>
-              <a:buFont typeface="Arial" panose="020B0604020202020204" pitchFamily="34" charset="0"/>
-              <a:buChar char="•"/>
-              <a:defRPr sz="1800" kern="1200">
-                <a:solidFill>
-                  <a:schemeClr val="tx1"/>
-                </a:solidFill>
-                <a:latin typeface="+mn-lt"/>
-                <a:ea typeface="+mn-ea"/>
-                <a:cs typeface="+mn-cs"/>
-              </a:defRPr>
-            </a:lvl7pPr>
-            <a:lvl8pPr marL="3429000" indent="-228600" algn="l" defTabSz="914400" rtl="0" eaLnBrk="1" latinLnBrk="0" hangingPunct="1">
-              <a:lnSpc>
-                <a:spcPct val="90000"/>
-              </a:lnSpc>
-              <a:spcBef>
-                <a:spcPts val="500"/>
-              </a:spcBef>
-              <a:buFont typeface="Arial" panose="020B0604020202020204" pitchFamily="34" charset="0"/>
-              <a:buChar char="•"/>
-              <a:defRPr sz="1800" kern="1200">
-                <a:solidFill>
-                  <a:schemeClr val="tx1"/>
-                </a:solidFill>
-                <a:latin typeface="+mn-lt"/>
-                <a:ea typeface="+mn-ea"/>
-                <a:cs typeface="+mn-cs"/>
-              </a:defRPr>
-            </a:lvl8pPr>
-            <a:lvl9pPr marL="3886200" indent="-228600" algn="l" defTabSz="914400" rtl="0" eaLnBrk="1" latinLnBrk="0" hangingPunct="1">
-              <a:lnSpc>
-                <a:spcPct val="90000"/>
-              </a:lnSpc>
-              <a:spcBef>
-                <a:spcPts val="500"/>
-              </a:spcBef>
-              <a:buFont typeface="Arial" panose="020B0604020202020204" pitchFamily="34" charset="0"/>
-              <a:buChar char="•"/>
-              <a:defRPr sz="1800" kern="1200">
-                <a:solidFill>
-                  <a:schemeClr val="tx1"/>
-                </a:solidFill>
-                <a:latin typeface="+mn-lt"/>
-                <a:ea typeface="+mn-ea"/>
-                <a:cs typeface="+mn-cs"/>
-              </a:defRPr>
-            </a:lvl9pPr>
-          </a:lstStyle>
-          <a:p>
-            <a:pPr marL="1654175">
-              <a:buFont typeface="Arial" panose="020B0604020202020204" pitchFamily="34" charset="0"/>
-              <a:buNone/>
-            </a:pPr>
-            <a:r>
-              <a:rPr lang="en-US" b="1" i="1" dirty="0"/>
-              <a:t>Matt:</a:t>
-            </a:r>
-          </a:p>
-          <a:p>
-            <a:pPr marL="1654175">
-              <a:buFont typeface="Arial" panose="020B0604020202020204" pitchFamily="34" charset="0"/>
-              <a:buNone/>
-            </a:pPr>
-            <a:r>
-              <a:rPr lang="en-US" i="1" dirty="0"/>
-              <a:t>Megan Higgs </a:t>
-            </a:r>
-            <a:r>
-              <a:rPr lang="en-US" dirty="0"/>
-              <a:t>(MSU)</a:t>
-            </a:r>
-          </a:p>
-          <a:p>
-            <a:pPr marL="1654175">
-              <a:buFont typeface="Arial" panose="020B0604020202020204" pitchFamily="34" charset="0"/>
-              <a:buNone/>
-            </a:pPr>
-            <a:r>
-              <a:rPr lang="en-US" i="1" dirty="0"/>
-              <a:t>Jim Robison-Cox </a:t>
-            </a:r>
-            <a:r>
-              <a:rPr lang="en-US" dirty="0"/>
-              <a:t>(MSU)</a:t>
-            </a:r>
-          </a:p>
-          <a:p>
-            <a:pPr marL="1654175">
-              <a:buFont typeface="Arial" panose="020B0604020202020204" pitchFamily="34" charset="0"/>
-              <a:buNone/>
-            </a:pPr>
-            <a:r>
-              <a:rPr lang="en-US" i="1" dirty="0"/>
-              <a:t>Al Parker </a:t>
-            </a:r>
-            <a:r>
-              <a:rPr lang="en-US" dirty="0"/>
-              <a:t>(MSU)</a:t>
-            </a:r>
-          </a:p>
-          <a:p>
-            <a:pPr marL="1654175">
-              <a:buFont typeface="Arial" panose="020B0604020202020204" pitchFamily="34" charset="0"/>
-              <a:buNone/>
-            </a:pPr>
-            <a:r>
-              <a:rPr lang="en-US" i="1" dirty="0"/>
-              <a:t>Hadley Wickham </a:t>
-            </a:r>
-            <a:r>
-              <a:rPr lang="en-US" dirty="0"/>
-              <a:t>(RStudio)</a:t>
-            </a:r>
-          </a:p>
-          <a:p>
-            <a:pPr marL="1654175">
-              <a:buFont typeface="Arial" panose="020B0604020202020204" pitchFamily="34" charset="0"/>
-              <a:buNone/>
-            </a:pPr>
-            <a:r>
-              <a:rPr lang="en-US" i="1" dirty="0" err="1"/>
-              <a:t>Yihui</a:t>
-            </a:r>
-            <a:r>
-              <a:rPr lang="en-US" i="1" dirty="0"/>
-              <a:t> Xie </a:t>
-            </a:r>
-            <a:r>
-              <a:rPr lang="en-US" dirty="0"/>
-              <a:t>(RStudio) </a:t>
-            </a:r>
-          </a:p>
-          <a:p>
-            <a:pPr marL="1654175">
-              <a:buFont typeface="Arial" panose="020B0604020202020204" pitchFamily="34" charset="0"/>
-              <a:buNone/>
-            </a:pPr>
-            <a:r>
-              <a:rPr lang="en-US" i="1" dirty="0"/>
-              <a:t>Grant Sanderson </a:t>
-            </a:r>
-            <a:r>
-              <a:rPr lang="en-US" dirty="0"/>
-              <a:t>(</a:t>
-            </a:r>
-            <a:r>
-              <a:rPr lang="en-US" dirty="0" err="1"/>
-              <a:t>Youtube</a:t>
-            </a:r>
-            <a:r>
-              <a:rPr lang="en-US" dirty="0"/>
-              <a:t>)</a:t>
-            </a:r>
-          </a:p>
-          <a:p>
-            <a:pPr marL="1654175">
-              <a:buNone/>
-            </a:pPr>
-            <a:r>
-              <a:rPr lang="en-US" i="1" dirty="0"/>
-              <a:t>Adam Reimer </a:t>
-            </a:r>
-            <a:r>
-              <a:rPr lang="en-US" dirty="0"/>
-              <a:t>(ADF&amp;G)</a:t>
-            </a:r>
-          </a:p>
-          <a:p>
-            <a:pPr marL="1654175">
-              <a:buFont typeface="Arial" panose="020B0604020202020204" pitchFamily="34" charset="0"/>
-              <a:buNone/>
-            </a:pPr>
-            <a:endParaRPr lang="en-US" dirty="0"/>
-          </a:p>
-          <a:p>
-            <a:pPr marL="1654175">
-              <a:buFont typeface="Arial" panose="020B0604020202020204" pitchFamily="34" charset="0"/>
-              <a:buNone/>
-            </a:pPr>
-            <a:endParaRPr lang="en-US" dirty="0"/>
-          </a:p>
-        </p:txBody>
-      </p:sp>
-      <p:sp>
-        <p:nvSpPr>
-          <p:cNvPr id="6" name="Content Placeholder 2">
-            <a:extLst>
-              <a:ext uri="{FF2B5EF4-FFF2-40B4-BE49-F238E27FC236}">
-                <a16:creationId xmlns:a16="http://schemas.microsoft.com/office/drawing/2014/main" id="{99E27B7A-5EC5-7E99-736F-5B6D061493DF}"/>
-              </a:ext>
-            </a:extLst>
-          </p:cNvPr>
-          <p:cNvSpPr txBox="1">
-            <a:spLocks/>
-          </p:cNvSpPr>
-          <p:nvPr/>
-        </p:nvSpPr>
-        <p:spPr>
-          <a:xfrm>
-            <a:off x="312198" y="1325563"/>
-            <a:ext cx="11512858" cy="3909303"/>
-          </a:xfrm>
-          <a:prstGeom prst="rect">
-            <a:avLst/>
-          </a:prstGeom>
-        </p:spPr>
-        <p:txBody>
-          <a:bodyPr vert="horz" lIns="91440" tIns="45720" rIns="91440" bIns="45720" rtlCol="0">
-            <a:normAutofit/>
-          </a:bodyPr>
-          <a:lstStyle>
-            <a:lvl1pPr marL="228600" indent="-228600" algn="l" defTabSz="914400" rtl="0" eaLnBrk="1" latinLnBrk="0" hangingPunct="1">
-              <a:lnSpc>
-                <a:spcPct val="90000"/>
-              </a:lnSpc>
-              <a:spcBef>
-                <a:spcPts val="1000"/>
-              </a:spcBef>
-              <a:buFont typeface="Arial" panose="020B0604020202020204" pitchFamily="34" charset="0"/>
-              <a:buChar char="•"/>
-              <a:defRPr sz="2800" kern="1200">
-                <a:solidFill>
-                  <a:schemeClr val="tx1"/>
-                </a:solidFill>
-                <a:latin typeface="+mn-lt"/>
-                <a:ea typeface="+mn-ea"/>
-                <a:cs typeface="+mn-cs"/>
-              </a:defRPr>
-            </a:lvl1pPr>
-            <a:lvl2pPr marL="685800" indent="-228600" algn="l" defTabSz="914400" rtl="0" eaLnBrk="1" latinLnBrk="0" hangingPunct="1">
-              <a:lnSpc>
-                <a:spcPct val="90000"/>
-              </a:lnSpc>
-              <a:spcBef>
-                <a:spcPts val="500"/>
-              </a:spcBef>
-              <a:buFont typeface="Arial" panose="020B0604020202020204" pitchFamily="34" charset="0"/>
-              <a:buChar char="•"/>
-              <a:defRPr sz="2400" kern="1200">
-                <a:solidFill>
-                  <a:schemeClr val="tx1"/>
-                </a:solidFill>
-                <a:latin typeface="+mn-lt"/>
-                <a:ea typeface="+mn-ea"/>
-                <a:cs typeface="+mn-cs"/>
-              </a:defRPr>
-            </a:lvl2pPr>
-            <a:lvl3pPr marL="1143000" indent="-228600" algn="l" defTabSz="914400" rtl="0" eaLnBrk="1" latinLnBrk="0" hangingPunct="1">
-              <a:lnSpc>
-                <a:spcPct val="90000"/>
-              </a:lnSpc>
-              <a:spcBef>
-                <a:spcPts val="500"/>
-              </a:spcBef>
-              <a:buFont typeface="Arial" panose="020B0604020202020204" pitchFamily="34" charset="0"/>
-              <a:buChar char="•"/>
-              <a:defRPr sz="2000" kern="1200">
-                <a:solidFill>
-                  <a:schemeClr val="tx1"/>
-                </a:solidFill>
-                <a:latin typeface="+mn-lt"/>
-                <a:ea typeface="+mn-ea"/>
-                <a:cs typeface="+mn-cs"/>
-              </a:defRPr>
-            </a:lvl3pPr>
-            <a:lvl4pPr marL="1600200" indent="-228600" algn="l" defTabSz="914400" rtl="0" eaLnBrk="1" latinLnBrk="0" hangingPunct="1">
-              <a:lnSpc>
-                <a:spcPct val="90000"/>
-              </a:lnSpc>
-              <a:spcBef>
-                <a:spcPts val="500"/>
-              </a:spcBef>
-              <a:buFont typeface="Arial" panose="020B0604020202020204" pitchFamily="34" charset="0"/>
-              <a:buChar char="•"/>
-              <a:defRPr sz="1800" kern="1200">
-                <a:solidFill>
-                  <a:schemeClr val="tx1"/>
-                </a:solidFill>
-                <a:latin typeface="+mn-lt"/>
-                <a:ea typeface="+mn-ea"/>
-                <a:cs typeface="+mn-cs"/>
-              </a:defRPr>
-            </a:lvl4pPr>
-            <a:lvl5pPr marL="2057400" indent="-228600" algn="l" defTabSz="914400" rtl="0" eaLnBrk="1" latinLnBrk="0" hangingPunct="1">
-              <a:lnSpc>
-                <a:spcPct val="90000"/>
-              </a:lnSpc>
-              <a:spcBef>
-                <a:spcPts val="500"/>
-              </a:spcBef>
-              <a:buFont typeface="Arial" panose="020B0604020202020204" pitchFamily="34" charset="0"/>
-              <a:buChar char="•"/>
-              <a:defRPr sz="1800" kern="1200">
-                <a:solidFill>
-                  <a:schemeClr val="tx1"/>
-                </a:solidFill>
-                <a:latin typeface="+mn-lt"/>
-                <a:ea typeface="+mn-ea"/>
-                <a:cs typeface="+mn-cs"/>
-              </a:defRPr>
-            </a:lvl5pPr>
-            <a:lvl6pPr marL="2514600" indent="-228600" algn="l" defTabSz="914400" rtl="0" eaLnBrk="1" latinLnBrk="0" hangingPunct="1">
-              <a:lnSpc>
-                <a:spcPct val="90000"/>
-              </a:lnSpc>
-              <a:spcBef>
-                <a:spcPts val="500"/>
-              </a:spcBef>
-              <a:buFont typeface="Arial" panose="020B0604020202020204" pitchFamily="34" charset="0"/>
-              <a:buChar char="•"/>
-              <a:defRPr sz="1800" kern="1200">
-                <a:solidFill>
-                  <a:schemeClr val="tx1"/>
-                </a:solidFill>
-                <a:latin typeface="+mn-lt"/>
-                <a:ea typeface="+mn-ea"/>
-                <a:cs typeface="+mn-cs"/>
-              </a:defRPr>
-            </a:lvl6pPr>
-            <a:lvl7pPr marL="2971800" indent="-228600" algn="l" defTabSz="914400" rtl="0" eaLnBrk="1" latinLnBrk="0" hangingPunct="1">
-              <a:lnSpc>
-                <a:spcPct val="90000"/>
-              </a:lnSpc>
-              <a:spcBef>
-                <a:spcPts val="500"/>
-              </a:spcBef>
-              <a:buFont typeface="Arial" panose="020B0604020202020204" pitchFamily="34" charset="0"/>
-              <a:buChar char="•"/>
-              <a:defRPr sz="1800" kern="1200">
-                <a:solidFill>
-                  <a:schemeClr val="tx1"/>
-                </a:solidFill>
-                <a:latin typeface="+mn-lt"/>
-                <a:ea typeface="+mn-ea"/>
-                <a:cs typeface="+mn-cs"/>
-              </a:defRPr>
-            </a:lvl7pPr>
-            <a:lvl8pPr marL="3429000" indent="-228600" algn="l" defTabSz="914400" rtl="0" eaLnBrk="1" latinLnBrk="0" hangingPunct="1">
-              <a:lnSpc>
-                <a:spcPct val="90000"/>
-              </a:lnSpc>
-              <a:spcBef>
-                <a:spcPts val="500"/>
-              </a:spcBef>
-              <a:buFont typeface="Arial" panose="020B0604020202020204" pitchFamily="34" charset="0"/>
-              <a:buChar char="•"/>
-              <a:defRPr sz="1800" kern="1200">
-                <a:solidFill>
-                  <a:schemeClr val="tx1"/>
-                </a:solidFill>
-                <a:latin typeface="+mn-lt"/>
-                <a:ea typeface="+mn-ea"/>
-                <a:cs typeface="+mn-cs"/>
-              </a:defRPr>
-            </a:lvl8pPr>
-            <a:lvl9pPr marL="3886200" indent="-228600" algn="l" defTabSz="914400" rtl="0" eaLnBrk="1" latinLnBrk="0" hangingPunct="1">
-              <a:lnSpc>
-                <a:spcPct val="90000"/>
-              </a:lnSpc>
-              <a:spcBef>
-                <a:spcPts val="500"/>
-              </a:spcBef>
-              <a:buFont typeface="Arial" panose="020B0604020202020204" pitchFamily="34" charset="0"/>
-              <a:buChar char="•"/>
-              <a:defRPr sz="1800" kern="1200">
-                <a:solidFill>
-                  <a:schemeClr val="tx1"/>
-                </a:solidFill>
-                <a:latin typeface="+mn-lt"/>
-                <a:ea typeface="+mn-ea"/>
-                <a:cs typeface="+mn-cs"/>
-              </a:defRPr>
-            </a:lvl9pPr>
-          </a:lstStyle>
-          <a:p>
-            <a:pPr marL="0" indent="0" algn="ctr">
-              <a:buFont typeface="Arial" panose="020B0604020202020204" pitchFamily="34" charset="0"/>
-              <a:buNone/>
-            </a:pPr>
-            <a:r>
-              <a:rPr lang="en-US" dirty="0"/>
-              <a:t>People who have taught, helped, or inspired us, or whose code we’ve have shamelessly copied and learned from:</a:t>
-            </a:r>
-          </a:p>
-        </p:txBody>
-      </p:sp>
-    </p:spTree>
-    <p:extLst>
-      <p:ext uri="{BB962C8B-B14F-4D97-AF65-F5344CB8AC3E}">
-        <p14:creationId xmlns:p14="http://schemas.microsoft.com/office/powerpoint/2010/main" val="3066844615"/>
-      </p:ext>
-    </p:extLst>
-  </p:cSld>
-  <p:clrMapOvr>
-    <a:masterClrMapping/>
-  </p:clrMapOvr>
-</p:sld>
-</file>
-
 <file path=ppt/slides/slide2.xml><?xml version="1.0" encoding="utf-8"?>
 <p:sld xmlns:a="http://schemas.openxmlformats.org/drawingml/2006/main" xmlns:r="http://schemas.openxmlformats.org/officeDocument/2006/relationships" xmlns:p="http://schemas.openxmlformats.org/presentationml/2006/main">
   <p:cSld>
@@ -29660,7 +28888,7 @@
           <a:p>
             <a:r>
               <a:rPr lang="en-US" sz="4800" b="1" dirty="0"/>
-              <a:t>Matt &amp; Justin’s Top 10 Tips</a:t>
+              <a:t>Logan &amp; Matt’s Top 10 Tips</a:t>
             </a:r>
           </a:p>
         </p:txBody>

</xml_diff>